<commit_message>
Added some of gru to presentation
</commit_message>
<xml_diff>
--- a/Methods.pptx
+++ b/Methods.pptx
@@ -5,7 +5,7 @@
     <p:sldMasterId id="2147483648" r:id="rId1"/>
   </p:sldMasterIdLst>
   <p:notesMasterIdLst>
-    <p:notesMasterId r:id="rId35"/>
+    <p:notesMasterId r:id="rId34"/>
   </p:notesMasterIdLst>
   <p:sldIdLst>
     <p:sldId id="256" r:id="rId2"/>
@@ -15,32 +15,31 @@
     <p:sldId id="286" r:id="rId6"/>
     <p:sldId id="287" r:id="rId7"/>
     <p:sldId id="288" r:id="rId8"/>
-    <p:sldId id="285" r:id="rId9"/>
-    <p:sldId id="259" r:id="rId10"/>
-    <p:sldId id="260" r:id="rId11"/>
-    <p:sldId id="261" r:id="rId12"/>
-    <p:sldId id="258" r:id="rId13"/>
-    <p:sldId id="262" r:id="rId14"/>
-    <p:sldId id="263" r:id="rId15"/>
-    <p:sldId id="264" r:id="rId16"/>
-    <p:sldId id="265" r:id="rId17"/>
-    <p:sldId id="266" r:id="rId18"/>
-    <p:sldId id="267" r:id="rId19"/>
-    <p:sldId id="268" r:id="rId20"/>
-    <p:sldId id="269" r:id="rId21"/>
-    <p:sldId id="270" r:id="rId22"/>
-    <p:sldId id="272" r:id="rId23"/>
-    <p:sldId id="273" r:id="rId24"/>
-    <p:sldId id="275" r:id="rId25"/>
-    <p:sldId id="276" r:id="rId26"/>
-    <p:sldId id="279" r:id="rId27"/>
-    <p:sldId id="274" r:id="rId28"/>
-    <p:sldId id="277" r:id="rId29"/>
-    <p:sldId id="280" r:id="rId30"/>
-    <p:sldId id="278" r:id="rId31"/>
-    <p:sldId id="281" r:id="rId32"/>
-    <p:sldId id="282" r:id="rId33"/>
-    <p:sldId id="271" r:id="rId34"/>
+    <p:sldId id="259" r:id="rId9"/>
+    <p:sldId id="260" r:id="rId10"/>
+    <p:sldId id="261" r:id="rId11"/>
+    <p:sldId id="258" r:id="rId12"/>
+    <p:sldId id="262" r:id="rId13"/>
+    <p:sldId id="263" r:id="rId14"/>
+    <p:sldId id="264" r:id="rId15"/>
+    <p:sldId id="265" r:id="rId16"/>
+    <p:sldId id="266" r:id="rId17"/>
+    <p:sldId id="267" r:id="rId18"/>
+    <p:sldId id="268" r:id="rId19"/>
+    <p:sldId id="269" r:id="rId20"/>
+    <p:sldId id="270" r:id="rId21"/>
+    <p:sldId id="272" r:id="rId22"/>
+    <p:sldId id="273" r:id="rId23"/>
+    <p:sldId id="275" r:id="rId24"/>
+    <p:sldId id="276" r:id="rId25"/>
+    <p:sldId id="279" r:id="rId26"/>
+    <p:sldId id="274" r:id="rId27"/>
+    <p:sldId id="277" r:id="rId28"/>
+    <p:sldId id="280" r:id="rId29"/>
+    <p:sldId id="278" r:id="rId30"/>
+    <p:sldId id="281" r:id="rId31"/>
+    <p:sldId id="282" r:id="rId32"/>
+    <p:sldId id="271" r:id="rId33"/>
   </p:sldIdLst>
   <p:sldSz cx="9144000" cy="6858000" type="screen4x3"/>
   <p:notesSz cx="6858000" cy="9144000"/>
@@ -1580,7 +1579,7 @@
           <a:p>
             <a:fld id="{2C34F011-42FC-4088-A2FA-A3253A70296E}" type="slidenum">
               <a:rPr lang="he-IL" smtClean="0"/>
-              <a:t>17</a:t>
+              <a:t>16</a:t>
             </a:fld>
             <a:endParaRPr lang="he-IL"/>
           </a:p>
@@ -4780,121 +4779,6 @@
       </p:grpSpPr>
       <p:sp>
         <p:nvSpPr>
-          <p:cNvPr id="2" name="Title 1"/>
-          <p:cNvSpPr>
-            <a:spLocks noGrp="1"/>
-          </p:cNvSpPr>
-          <p:nvPr>
-            <p:ph type="title"/>
-          </p:nvPr>
-        </p:nvSpPr>
-        <p:spPr/>
-        <p:txBody>
-          <a:bodyPr>
-            <a:normAutofit/>
-          </a:bodyPr>
-          <a:lstStyle/>
-          <a:p>
-            <a:r>
-              <a:rPr lang="en-US" dirty="0"/>
-              <a:t>Comparing queries of new and experienced users</a:t>
-            </a:r>
-            <a:endParaRPr lang="he-IL" dirty="0"/>
-          </a:p>
-        </p:txBody>
-      </p:sp>
-      <p:sp>
-        <p:nvSpPr>
-          <p:cNvPr id="4" name="Content Placeholder 3"/>
-          <p:cNvSpPr>
-            <a:spLocks noGrp="1"/>
-          </p:cNvSpPr>
-          <p:nvPr>
-            <p:ph idx="1"/>
-          </p:nvPr>
-        </p:nvSpPr>
-        <p:spPr>
-          <a:xfrm>
-            <a:off x="457200" y="1600200"/>
-            <a:ext cx="8229600" cy="4709120"/>
-          </a:xfrm>
-        </p:spPr>
-        <p:txBody>
-          <a:bodyPr>
-            <a:normAutofit/>
-          </a:bodyPr>
-          <a:lstStyle/>
-          <a:p>
-            <a:r>
-              <a:rPr lang="en-US" dirty="0"/>
-              <a:t>It is visible that there are several dominant queries:</a:t>
-            </a:r>
-          </a:p>
-          <a:p>
-            <a:pPr lvl="1"/>
-            <a:r>
-              <a:rPr lang="en-US" dirty="0" err="1"/>
-              <a:t>RequestSummaryQuery</a:t>
-            </a:r>
-            <a:endParaRPr lang="en-US" dirty="0"/>
-          </a:p>
-          <a:p>
-            <a:pPr lvl="1"/>
-            <a:r>
-              <a:rPr lang="en-US" dirty="0" err="1"/>
-              <a:t>SearchTimelineQuery</a:t>
-            </a:r>
-            <a:endParaRPr lang="en-US" dirty="0"/>
-          </a:p>
-          <a:p>
-            <a:pPr lvl="1"/>
-            <a:r>
-              <a:rPr lang="en-US" dirty="0" err="1"/>
-              <a:t>RequestSeriesAndSummaryQuery</a:t>
-            </a:r>
-            <a:endParaRPr lang="en-US" dirty="0"/>
-          </a:p>
-          <a:p>
-            <a:endParaRPr lang="en-US" dirty="0"/>
-          </a:p>
-          <a:p>
-            <a:pPr lvl="1"/>
-            <a:endParaRPr lang="en-US" dirty="0"/>
-          </a:p>
-        </p:txBody>
-      </p:sp>
-    </p:spTree>
-    <p:extLst>
-      <p:ext uri="{BB962C8B-B14F-4D97-AF65-F5344CB8AC3E}">
-        <p14:creationId xmlns:p14="http://schemas.microsoft.com/office/powerpoint/2010/main" val="1788058214"/>
-      </p:ext>
-    </p:extLst>
-  </p:cSld>
-  <p:clrMapOvr>
-    <a:masterClrMapping/>
-  </p:clrMapOvr>
-</p:sld>
-</file>
-
-<file path=ppt/slides/slide11.xml><?xml version="1.0" encoding="utf-8"?>
-<p:sld xmlns:a="http://schemas.openxmlformats.org/drawingml/2006/main" xmlns:r="http://schemas.openxmlformats.org/officeDocument/2006/relationships" xmlns:p="http://schemas.openxmlformats.org/presentationml/2006/main">
-  <p:cSld>
-    <p:spTree>
-      <p:nvGrpSpPr>
-        <p:cNvPr id="1" name=""/>
-        <p:cNvGrpSpPr/>
-        <p:nvPr/>
-      </p:nvGrpSpPr>
-      <p:grpSpPr>
-        <a:xfrm>
-          <a:off x="0" y="0"/>
-          <a:ext cx="0" cy="0"/>
-          <a:chOff x="0" y="0"/>
-          <a:chExt cx="0" cy="0"/>
-        </a:xfrm>
-      </p:grpSpPr>
-      <p:sp>
-        <p:nvSpPr>
           <p:cNvPr id="7" name="Title 6"/>
           <p:cNvSpPr>
             <a:spLocks noGrp="1"/>
@@ -5031,7 +4915,7 @@
 </p:sld>
 </file>
 
-<file path=ppt/slides/slide12.xml><?xml version="1.0" encoding="utf-8"?>
+<file path=ppt/slides/slide11.xml><?xml version="1.0" encoding="utf-8"?>
 <p:sld xmlns:a="http://schemas.openxmlformats.org/drawingml/2006/main" xmlns:r="http://schemas.openxmlformats.org/officeDocument/2006/relationships" xmlns:p="http://schemas.openxmlformats.org/presentationml/2006/main">
   <p:cSld>
     <p:spTree>
@@ -5154,7 +5038,7 @@
 </p:sld>
 </file>
 
-<file path=ppt/slides/slide13.xml><?xml version="1.0" encoding="utf-8"?>
+<file path=ppt/slides/slide12.xml><?xml version="1.0" encoding="utf-8"?>
 <p:sld xmlns:a="http://schemas.openxmlformats.org/drawingml/2006/main" xmlns:r="http://schemas.openxmlformats.org/officeDocument/2006/relationships" xmlns:p="http://schemas.openxmlformats.org/presentationml/2006/main">
   <p:cSld>
     <p:spTree>
@@ -5277,7 +5161,7 @@
 </p:sld>
 </file>
 
-<file path=ppt/slides/slide14.xml><?xml version="1.0" encoding="utf-8"?>
+<file path=ppt/slides/slide13.xml><?xml version="1.0" encoding="utf-8"?>
 <p:sld xmlns:a="http://schemas.openxmlformats.org/drawingml/2006/main" xmlns:r="http://schemas.openxmlformats.org/officeDocument/2006/relationships" xmlns:p="http://schemas.openxmlformats.org/presentationml/2006/main">
   <p:cSld>
     <p:spTree>
@@ -5400,7 +5284,7 @@
 </p:sld>
 </file>
 
-<file path=ppt/slides/slide15.xml><?xml version="1.0" encoding="utf-8"?>
+<file path=ppt/slides/slide14.xml><?xml version="1.0" encoding="utf-8"?>
 <p:sld xmlns:a="http://schemas.openxmlformats.org/drawingml/2006/main" xmlns:r="http://schemas.openxmlformats.org/officeDocument/2006/relationships" xmlns:p="http://schemas.openxmlformats.org/presentationml/2006/main">
   <p:cSld>
     <p:spTree>
@@ -5523,7 +5407,7 @@
 </p:sld>
 </file>
 
-<file path=ppt/slides/slide16.xml><?xml version="1.0" encoding="utf-8"?>
+<file path=ppt/slides/slide15.xml><?xml version="1.0" encoding="utf-8"?>
 <p:sld xmlns:a="http://schemas.openxmlformats.org/drawingml/2006/main" xmlns:r="http://schemas.openxmlformats.org/officeDocument/2006/relationships" xmlns:p="http://schemas.openxmlformats.org/presentationml/2006/main">
   <p:cSld>
     <p:spTree>
@@ -5646,6 +5530,151 @@
 </p:sld>
 </file>
 
+<file path=ppt/slides/slide16.xml><?xml version="1.0" encoding="utf-8"?>
+<p:sld xmlns:a="http://schemas.openxmlformats.org/drawingml/2006/main" xmlns:r="http://schemas.openxmlformats.org/officeDocument/2006/relationships" xmlns:p="http://schemas.openxmlformats.org/presentationml/2006/main">
+  <p:cSld>
+    <p:spTree>
+      <p:nvGrpSpPr>
+        <p:cNvPr id="1" name=""/>
+        <p:cNvGrpSpPr/>
+        <p:nvPr/>
+      </p:nvGrpSpPr>
+      <p:grpSpPr>
+        <a:xfrm>
+          <a:off x="0" y="0"/>
+          <a:ext cx="0" cy="0"/>
+          <a:chOff x="0" y="0"/>
+          <a:chExt cx="0" cy="0"/>
+        </a:xfrm>
+      </p:grpSpPr>
+      <p:sp>
+        <p:nvSpPr>
+          <p:cNvPr id="2" name="Title 1"/>
+          <p:cNvSpPr>
+            <a:spLocks noGrp="1"/>
+          </p:cNvSpPr>
+          <p:nvPr>
+            <p:ph type="title"/>
+          </p:nvPr>
+        </p:nvSpPr>
+        <p:spPr/>
+        <p:txBody>
+          <a:bodyPr/>
+          <a:lstStyle/>
+          <a:p>
+            <a:r>
+              <a:rPr lang="en-US" dirty="0"/>
+              <a:t>Remarks - looking at specific users</a:t>
+            </a:r>
+            <a:endParaRPr lang="he-IL" dirty="0"/>
+          </a:p>
+        </p:txBody>
+      </p:sp>
+      <p:sp>
+        <p:nvSpPr>
+          <p:cNvPr id="3" name="Content Placeholder 2"/>
+          <p:cNvSpPr>
+            <a:spLocks noGrp="1"/>
+          </p:cNvSpPr>
+          <p:nvPr>
+            <p:ph idx="1"/>
+          </p:nvPr>
+        </p:nvSpPr>
+        <p:spPr/>
+        <p:txBody>
+          <a:bodyPr>
+            <a:normAutofit lnSpcReduction="10000"/>
+          </a:bodyPr>
+          <a:lstStyle/>
+          <a:p>
+            <a:r>
+              <a:rPr lang="en-US" dirty="0"/>
+              <a:t>For the users with above 30 sessions, about half of the sessions are considerably short, meaning that there are less than 100 queries per session, while some sessions may reach 1000 queries. However, the first user had only short sessions, most of length below 20.</a:t>
+            </a:r>
+          </a:p>
+          <a:p>
+            <a:endParaRPr lang="en-US" dirty="0"/>
+          </a:p>
+          <a:p>
+            <a:r>
+              <a:rPr lang="en-US" dirty="0"/>
+              <a:t>Looking at the first user (20&lt; queries &lt;30), we can see that the most common queries are:</a:t>
+            </a:r>
+          </a:p>
+          <a:p>
+            <a:pPr lvl="1"/>
+            <a:r>
+              <a:rPr lang="en-US" dirty="0" err="1"/>
+              <a:t>RequestSeriesandSummaryQuery</a:t>
+            </a:r>
+            <a:endParaRPr lang="en-US" dirty="0"/>
+          </a:p>
+          <a:p>
+            <a:pPr lvl="1"/>
+            <a:r>
+              <a:rPr lang="en-US" dirty="0" err="1"/>
+              <a:t>RequestSummaryQuery</a:t>
+            </a:r>
+            <a:endParaRPr lang="en-US" dirty="0"/>
+          </a:p>
+          <a:p>
+            <a:pPr lvl="1"/>
+            <a:r>
+              <a:rPr lang="en-US" dirty="0" err="1"/>
+              <a:t>SearchResultsQuery</a:t>
+            </a:r>
+            <a:endParaRPr lang="en-US" dirty="0"/>
+          </a:p>
+          <a:p>
+            <a:pPr lvl="1"/>
+            <a:r>
+              <a:rPr lang="en-US" dirty="0" err="1"/>
+              <a:t>SearchTimelineQuery</a:t>
+            </a:r>
+            <a:endParaRPr lang="en-US" dirty="0"/>
+          </a:p>
+          <a:p>
+            <a:pPr lvl="1"/>
+            <a:r>
+              <a:rPr lang="en-US" dirty="0" err="1"/>
+              <a:t>SegmentationSummaryQuery</a:t>
+            </a:r>
+            <a:endParaRPr lang="en-US" dirty="0"/>
+          </a:p>
+          <a:p>
+            <a:pPr lvl="1"/>
+            <a:r>
+              <a:rPr lang="en-US" b="1" dirty="0" err="1"/>
+              <a:t>GetTokenQuery</a:t>
+            </a:r>
+            <a:endParaRPr lang="en-US" b="1" dirty="0"/>
+          </a:p>
+          <a:p>
+            <a:pPr lvl="1"/>
+            <a:endParaRPr lang="en-US" dirty="0"/>
+          </a:p>
+          <a:p>
+            <a:pPr lvl="1"/>
+            <a:endParaRPr lang="en-US" dirty="0"/>
+          </a:p>
+          <a:p>
+            <a:endParaRPr lang="he-IL" dirty="0"/>
+          </a:p>
+        </p:txBody>
+      </p:sp>
+    </p:spTree>
+    <p:extLst>
+      <p:ext uri="{BB962C8B-B14F-4D97-AF65-F5344CB8AC3E}">
+        <p14:creationId xmlns:p14="http://schemas.microsoft.com/office/powerpoint/2010/main" val="527352503"/>
+      </p:ext>
+    </p:extLst>
+  </p:cSld>
+  <p:clrMapOvr>
+    <a:masterClrMapping/>
+  </p:clrMapOvr>
+</p:sld>
+</file>
+
 <file path=ppt/slides/slide17.xml><?xml version="1.0" encoding="utf-8"?>
 <p:sld xmlns:a="http://schemas.openxmlformats.org/drawingml/2006/main" xmlns:r="http://schemas.openxmlformats.org/officeDocument/2006/relationships" xmlns:p="http://schemas.openxmlformats.org/presentationml/2006/main">
   <p:cSld>
@@ -5699,45 +5728,42 @@
         <p:spPr/>
         <p:txBody>
           <a:bodyPr>
-            <a:normAutofit lnSpcReduction="10000"/>
+            <a:normAutofit fontScale="92500" lnSpcReduction="10000"/>
           </a:bodyPr>
           <a:lstStyle/>
           <a:p>
             <a:r>
               <a:rPr lang="en-US" dirty="0"/>
-              <a:t>For the users with above 30 sessions, about half of the sessions are considerably short, meaning that there are less than 100 queries per session, while some sessions may reach 1000 queries. However, the first user had only short sessions, most of length below 20.</a:t>
-            </a:r>
-          </a:p>
-          <a:p>
-            <a:endParaRPr lang="en-US" dirty="0"/>
-          </a:p>
-          <a:p>
-            <a:r>
-              <a:rPr lang="en-US" dirty="0"/>
-              <a:t>Looking at the first user (20&lt; queries &lt;30), we can see that the most common queries are:</a:t>
-            </a:r>
-          </a:p>
-          <a:p>
-            <a:pPr lvl="1"/>
-            <a:r>
-              <a:rPr lang="en-US" dirty="0" err="1"/>
-              <a:t>RequestSeriesandSummaryQuery</a:t>
-            </a:r>
-            <a:endParaRPr lang="en-US" dirty="0"/>
-          </a:p>
-          <a:p>
-            <a:pPr lvl="1"/>
+              <a:t>Examining the second user (30&lt; queries &lt;40), we can see that </a:t>
+            </a:r>
             <a:r>
               <a:rPr lang="en-US" dirty="0" err="1"/>
               <a:t>RequestSummaryQuery</a:t>
             </a:r>
+            <a:r>
+              <a:rPr lang="en-US" dirty="0"/>
+              <a:t> is the most common query in his sessions.</a:t>
+            </a:r>
+          </a:p>
+          <a:p>
+            <a:r>
+              <a:rPr lang="en-US" dirty="0"/>
+              <a:t>The longer sessions are similar, having the queries:</a:t>
+            </a:r>
+          </a:p>
+          <a:p>
+            <a:pPr lvl="1"/>
+            <a:r>
+              <a:rPr lang="en-US" dirty="0" err="1"/>
+              <a:t>AggregateQuery</a:t>
+            </a:r>
             <a:endParaRPr lang="en-US" dirty="0"/>
           </a:p>
           <a:p>
             <a:pPr lvl="1"/>
             <a:r>
               <a:rPr lang="en-US" dirty="0" err="1"/>
-              <a:t>SearchResultsQuery</a:t>
+              <a:t>ComponentAggregateMetricsQuery</a:t>
             </a:r>
             <a:endParaRPr lang="en-US" dirty="0"/>
           </a:p>
@@ -5745,7 +5771,55 @@
             <a:pPr lvl="1"/>
             <a:r>
               <a:rPr lang="en-US" dirty="0" err="1"/>
-              <a:t>SearchTimelineQuery</a:t>
+              <a:t>AlertQuery</a:t>
+            </a:r>
+            <a:endParaRPr lang="en-US" dirty="0"/>
+          </a:p>
+          <a:p>
+            <a:pPr lvl="1"/>
+            <a:r>
+              <a:rPr lang="en-US" dirty="0" err="1"/>
+              <a:t>GetToken</a:t>
+            </a:r>
+            <a:endParaRPr lang="en-US" dirty="0"/>
+          </a:p>
+          <a:p>
+            <a:pPr lvl="1"/>
+            <a:r>
+              <a:rPr lang="en-US" dirty="0" err="1"/>
+              <a:t>NoCustomEventsEverQuery</a:t>
+            </a:r>
+            <a:endParaRPr lang="en-US" dirty="0"/>
+          </a:p>
+          <a:p>
+            <a:pPr lvl="1"/>
+            <a:r>
+              <a:rPr lang="en-US" dirty="0" err="1"/>
+              <a:t>NoPageViewsEverQuery</a:t>
+            </a:r>
+            <a:endParaRPr lang="en-US" dirty="0"/>
+          </a:p>
+          <a:p>
+            <a:pPr lvl="1"/>
+            <a:r>
+              <a:rPr lang="en-US" dirty="0" err="1"/>
+              <a:t>NoRequestsEverQuery</a:t>
+            </a:r>
+            <a:endParaRPr lang="en-US" dirty="0"/>
+          </a:p>
+          <a:p>
+            <a:pPr lvl="1"/>
+            <a:r>
+              <a:rPr lang="en-US" dirty="0" err="1"/>
+              <a:t>RequestsSeriesandSummaryQuery</a:t>
+            </a:r>
+            <a:endParaRPr lang="en-US" dirty="0"/>
+          </a:p>
+          <a:p>
+            <a:pPr lvl="1"/>
+            <a:r>
+              <a:rPr lang="en-US" dirty="0" err="1"/>
+              <a:t>RequestSummaryQuery</a:t>
             </a:r>
             <a:endParaRPr lang="en-US" dirty="0"/>
           </a:p>
@@ -5760,20 +5834,13 @@
           <a:p>
             <a:pPr lvl="1"/>
             <a:r>
-              <a:rPr lang="en-US" b="1" dirty="0" err="1"/>
-              <a:t>GetTokenQuery</a:t>
-            </a:r>
-            <a:endParaRPr lang="en-US" b="1" dirty="0"/>
+              <a:rPr lang="en-US" dirty="0" err="1"/>
+              <a:t>WebtestsQuery</a:t>
+            </a:r>
+            <a:endParaRPr lang="en-US" dirty="0"/>
           </a:p>
           <a:p>
             <a:pPr lvl="1"/>
-            <a:endParaRPr lang="en-US" dirty="0"/>
-          </a:p>
-          <a:p>
-            <a:pPr lvl="1"/>
-            <a:endParaRPr lang="en-US" dirty="0"/>
-          </a:p>
-          <a:p>
             <a:endParaRPr lang="he-IL" dirty="0"/>
           </a:p>
         </p:txBody>
@@ -5781,7 +5848,7 @@
     </p:spTree>
     <p:extLst>
       <p:ext uri="{BB962C8B-B14F-4D97-AF65-F5344CB8AC3E}">
-        <p14:creationId xmlns:p14="http://schemas.microsoft.com/office/powerpoint/2010/main" val="527352503"/>
+        <p14:creationId xmlns:p14="http://schemas.microsoft.com/office/powerpoint/2010/main" val="1813306801"/>
       </p:ext>
     </p:extLst>
   </p:cSld>
@@ -5843,120 +5910,13 @@
         </p:nvSpPr>
         <p:spPr/>
         <p:txBody>
-          <a:bodyPr>
-            <a:normAutofit fontScale="92500" lnSpcReduction="10000"/>
-          </a:bodyPr>
+          <a:bodyPr/>
           <a:lstStyle/>
           <a:p>
             <a:r>
               <a:rPr lang="en-US" dirty="0"/>
-              <a:t>Examining the second user (30&lt; queries &lt;40), we can see that </a:t>
-            </a:r>
-            <a:r>
-              <a:rPr lang="en-US" dirty="0" err="1"/>
-              <a:t>RequestSummaryQuery</a:t>
-            </a:r>
-            <a:r>
-              <a:rPr lang="en-US" dirty="0"/>
-              <a:t> is the most common query in his sessions.</a:t>
-            </a:r>
-          </a:p>
-          <a:p>
-            <a:r>
-              <a:rPr lang="en-US" dirty="0"/>
-              <a:t>The longer sessions are similar, having the queries:</a:t>
-            </a:r>
-          </a:p>
-          <a:p>
-            <a:pPr lvl="1"/>
-            <a:r>
-              <a:rPr lang="en-US" dirty="0" err="1"/>
-              <a:t>AggregateQuery</a:t>
-            </a:r>
-            <a:endParaRPr lang="en-US" dirty="0"/>
-          </a:p>
-          <a:p>
-            <a:pPr lvl="1"/>
-            <a:r>
-              <a:rPr lang="en-US" dirty="0" err="1"/>
-              <a:t>ComponentAggregateMetricsQuery</a:t>
-            </a:r>
-            <a:endParaRPr lang="en-US" dirty="0"/>
-          </a:p>
-          <a:p>
-            <a:pPr lvl="1"/>
-            <a:r>
-              <a:rPr lang="en-US" dirty="0" err="1"/>
-              <a:t>AlertQuery</a:t>
-            </a:r>
-            <a:endParaRPr lang="en-US" dirty="0"/>
-          </a:p>
-          <a:p>
-            <a:pPr lvl="1"/>
-            <a:r>
-              <a:rPr lang="en-US" dirty="0" err="1"/>
-              <a:t>GetToken</a:t>
-            </a:r>
-            <a:endParaRPr lang="en-US" dirty="0"/>
-          </a:p>
-          <a:p>
-            <a:pPr lvl="1"/>
-            <a:r>
-              <a:rPr lang="en-US" dirty="0" err="1"/>
-              <a:t>NoCustomEventsEverQuery</a:t>
-            </a:r>
-            <a:endParaRPr lang="en-US" dirty="0"/>
-          </a:p>
-          <a:p>
-            <a:pPr lvl="1"/>
-            <a:r>
-              <a:rPr lang="en-US" dirty="0" err="1"/>
-              <a:t>NoPageViewsEverQuery</a:t>
-            </a:r>
-            <a:endParaRPr lang="en-US" dirty="0"/>
-          </a:p>
-          <a:p>
-            <a:pPr lvl="1"/>
-            <a:r>
-              <a:rPr lang="en-US" dirty="0" err="1"/>
-              <a:t>NoRequestsEverQuery</a:t>
-            </a:r>
-            <a:endParaRPr lang="en-US" dirty="0"/>
-          </a:p>
-          <a:p>
-            <a:pPr lvl="1"/>
-            <a:r>
-              <a:rPr lang="en-US" dirty="0" err="1"/>
-              <a:t>RequestsSeriesandSummaryQuery</a:t>
-            </a:r>
-            <a:endParaRPr lang="en-US" dirty="0"/>
-          </a:p>
-          <a:p>
-            <a:pPr lvl="1"/>
-            <a:r>
-              <a:rPr lang="en-US" dirty="0" err="1"/>
-              <a:t>RequestSummaryQuery</a:t>
-            </a:r>
-            <a:endParaRPr lang="en-US" dirty="0"/>
-          </a:p>
-          <a:p>
-            <a:pPr lvl="1"/>
-            <a:r>
-              <a:rPr lang="en-US" dirty="0" err="1"/>
-              <a:t>SegmentationSummaryQuery</a:t>
-            </a:r>
-            <a:endParaRPr lang="en-US" dirty="0"/>
-          </a:p>
-          <a:p>
-            <a:pPr lvl="1"/>
-            <a:r>
-              <a:rPr lang="en-US" dirty="0" err="1"/>
-              <a:t>WebtestsQuery</a:t>
-            </a:r>
-            <a:endParaRPr lang="en-US" dirty="0"/>
-          </a:p>
-          <a:p>
-            <a:pPr lvl="1"/>
+              <a:t>The third user’s (40 &lt; queries &lt; 50) behavior is similar to the second user, but his sessions are shorter compared to the second user’s sessions.</a:t>
+            </a:r>
             <a:endParaRPr lang="he-IL" dirty="0"/>
           </a:p>
         </p:txBody>
@@ -5964,7 +5924,7 @@
     </p:spTree>
     <p:extLst>
       <p:ext uri="{BB962C8B-B14F-4D97-AF65-F5344CB8AC3E}">
-        <p14:creationId xmlns:p14="http://schemas.microsoft.com/office/powerpoint/2010/main" val="1813306801"/>
+        <p14:creationId xmlns:p14="http://schemas.microsoft.com/office/powerpoint/2010/main" val="1296578577"/>
       </p:ext>
     </p:extLst>
   </p:cSld>
@@ -6031,16 +5991,47 @@
           <a:p>
             <a:r>
               <a:rPr lang="en-US" dirty="0"/>
-              <a:t>The third user’s (40 &lt; queries &lt; 50) behavior is similar to the second user, but his sessions are shorter compared to the second user’s sessions.</a:t>
-            </a:r>
-            <a:endParaRPr lang="he-IL" dirty="0"/>
+              <a:t>The fourth user (50 &lt; query &lt; 60) behavior is very similar to the last two users, while adding the queries:</a:t>
+            </a:r>
+          </a:p>
+          <a:p>
+            <a:pPr lvl="1"/>
+            <a:r>
+              <a:rPr lang="en-US" dirty="0" err="1"/>
+              <a:t>SearchResultsQuery</a:t>
+            </a:r>
+            <a:endParaRPr lang="en-US" dirty="0"/>
+          </a:p>
+          <a:p>
+            <a:pPr lvl="1"/>
+            <a:r>
+              <a:rPr lang="en-US" dirty="0" err="1"/>
+              <a:t>SearchTimelineQuery</a:t>
+            </a:r>
+            <a:endParaRPr lang="en-US" dirty="0"/>
+          </a:p>
+          <a:p>
+            <a:pPr lvl="1"/>
+            <a:r>
+              <a:rPr lang="en-US" dirty="0" err="1"/>
+              <a:t>SegmentationSeriesQuery</a:t>
+            </a:r>
+            <a:endParaRPr lang="en-US" dirty="0"/>
+          </a:p>
+          <a:p>
+            <a:pPr lvl="1"/>
+            <a:r>
+              <a:rPr lang="en-US" dirty="0" err="1"/>
+              <a:t>SegmentationSummaryQuery</a:t>
+            </a:r>
+            <a:endParaRPr lang="en-US" dirty="0"/>
           </a:p>
         </p:txBody>
       </p:sp>
     </p:spTree>
     <p:extLst>
       <p:ext uri="{BB962C8B-B14F-4D97-AF65-F5344CB8AC3E}">
-        <p14:creationId xmlns:p14="http://schemas.microsoft.com/office/powerpoint/2010/main" val="1296578577"/>
+        <p14:creationId xmlns:p14="http://schemas.microsoft.com/office/powerpoint/2010/main" val="3913965373"/>
       </p:ext>
     </p:extLst>
   </p:cSld>
@@ -6197,14 +6188,14 @@
           <a:p>
             <a:r>
               <a:rPr lang="en-US" dirty="0"/>
-              <a:t>The fourth user (50 &lt; query &lt; 60) behavior is very similar to the last two users, while adding the queries:</a:t>
+              <a:t>The last user behavior (60 &lt; queries) is similar to the previous users, while his rate of short sessions is higher (over 60% of his sessions are shorter than 100 queries). His common queries are:</a:t>
             </a:r>
           </a:p>
           <a:p>
             <a:pPr lvl="1"/>
             <a:r>
               <a:rPr lang="en-US" dirty="0" err="1"/>
-              <a:t>SearchResultsQuery</a:t>
+              <a:t>ComponentAggregateMetricsQuery</a:t>
             </a:r>
             <a:endParaRPr lang="en-US" dirty="0"/>
           </a:p>
@@ -6212,7 +6203,7 @@
             <a:pPr lvl="1"/>
             <a:r>
               <a:rPr lang="en-US" dirty="0" err="1"/>
-              <a:t>SearchTimelineQuery</a:t>
+              <a:t>GetTokenQuery</a:t>
             </a:r>
             <a:endParaRPr lang="en-US" dirty="0"/>
           </a:p>
@@ -6220,7 +6211,7 @@
             <a:pPr lvl="1"/>
             <a:r>
               <a:rPr lang="en-US" dirty="0" err="1"/>
-              <a:t>SegmentationSeriesQuery</a:t>
+              <a:t>NoRequestsEverQuery</a:t>
             </a:r>
             <a:endParaRPr lang="en-US" dirty="0"/>
           </a:p>
@@ -6228,7 +6219,31 @@
             <a:pPr lvl="1"/>
             <a:r>
               <a:rPr lang="en-US" dirty="0" err="1"/>
-              <a:t>SegmentationSummaryQuery</a:t>
+              <a:t>RequestsSummaryQuery</a:t>
+            </a:r>
+            <a:endParaRPr lang="en-US" dirty="0"/>
+          </a:p>
+          <a:p>
+            <a:pPr lvl="1"/>
+            <a:r>
+              <a:rPr lang="en-US" b="1" dirty="0" err="1"/>
+              <a:t>SearchResultsquery</a:t>
+            </a:r>
+            <a:endParaRPr lang="en-US" b="1" dirty="0"/>
+          </a:p>
+          <a:p>
+            <a:pPr lvl="1"/>
+            <a:r>
+              <a:rPr lang="en-US" dirty="0" err="1"/>
+              <a:t>WebTestQuery</a:t>
+            </a:r>
+            <a:endParaRPr lang="en-US" dirty="0"/>
+          </a:p>
+          <a:p>
+            <a:pPr lvl="1"/>
+            <a:r>
+              <a:rPr lang="en-US" dirty="0" err="1"/>
+              <a:t>NoPageViewsEverQuery</a:t>
             </a:r>
             <a:endParaRPr lang="en-US" dirty="0"/>
           </a:p>
@@ -6237,7 +6252,7 @@
     </p:spTree>
     <p:extLst>
       <p:ext uri="{BB962C8B-B14F-4D97-AF65-F5344CB8AC3E}">
-        <p14:creationId xmlns:p14="http://schemas.microsoft.com/office/powerpoint/2010/main" val="3913965373"/>
+        <p14:creationId xmlns:p14="http://schemas.microsoft.com/office/powerpoint/2010/main" val="1497836227"/>
       </p:ext>
     </p:extLst>
   </p:cSld>
@@ -6281,137 +6296,6 @@
           <a:p>
             <a:r>
               <a:rPr lang="en-US" dirty="0"/>
-              <a:t>Remarks - looking at specific users</a:t>
-            </a:r>
-            <a:endParaRPr lang="he-IL" dirty="0"/>
-          </a:p>
-        </p:txBody>
-      </p:sp>
-      <p:sp>
-        <p:nvSpPr>
-          <p:cNvPr id="3" name="Content Placeholder 2"/>
-          <p:cNvSpPr>
-            <a:spLocks noGrp="1"/>
-          </p:cNvSpPr>
-          <p:nvPr>
-            <p:ph idx="1"/>
-          </p:nvPr>
-        </p:nvSpPr>
-        <p:spPr/>
-        <p:txBody>
-          <a:bodyPr/>
-          <a:lstStyle/>
-          <a:p>
-            <a:r>
-              <a:rPr lang="en-US" dirty="0"/>
-              <a:t>The last user behavior (60 &lt; queries) is similar to the previous users, while his rate of short sessions is higher (over 60% of his sessions are shorter than 100 queries). His common queries are:</a:t>
-            </a:r>
-          </a:p>
-          <a:p>
-            <a:pPr lvl="1"/>
-            <a:r>
-              <a:rPr lang="en-US" dirty="0" err="1"/>
-              <a:t>ComponentAggregateMetricsQuery</a:t>
-            </a:r>
-            <a:endParaRPr lang="en-US" dirty="0"/>
-          </a:p>
-          <a:p>
-            <a:pPr lvl="1"/>
-            <a:r>
-              <a:rPr lang="en-US" dirty="0" err="1"/>
-              <a:t>GetTokenQuery</a:t>
-            </a:r>
-            <a:endParaRPr lang="en-US" dirty="0"/>
-          </a:p>
-          <a:p>
-            <a:pPr lvl="1"/>
-            <a:r>
-              <a:rPr lang="en-US" dirty="0" err="1"/>
-              <a:t>NoRequestsEverQuery</a:t>
-            </a:r>
-            <a:endParaRPr lang="en-US" dirty="0"/>
-          </a:p>
-          <a:p>
-            <a:pPr lvl="1"/>
-            <a:r>
-              <a:rPr lang="en-US" dirty="0" err="1"/>
-              <a:t>RequestsSummaryQuery</a:t>
-            </a:r>
-            <a:endParaRPr lang="en-US" dirty="0"/>
-          </a:p>
-          <a:p>
-            <a:pPr lvl="1"/>
-            <a:r>
-              <a:rPr lang="en-US" b="1" dirty="0" err="1"/>
-              <a:t>SearchResultsquery</a:t>
-            </a:r>
-            <a:endParaRPr lang="en-US" b="1" dirty="0"/>
-          </a:p>
-          <a:p>
-            <a:pPr lvl="1"/>
-            <a:r>
-              <a:rPr lang="en-US" dirty="0" err="1"/>
-              <a:t>WebTestQuery</a:t>
-            </a:r>
-            <a:endParaRPr lang="en-US" dirty="0"/>
-          </a:p>
-          <a:p>
-            <a:pPr lvl="1"/>
-            <a:r>
-              <a:rPr lang="en-US" dirty="0" err="1"/>
-              <a:t>NoPageViewsEverQuery</a:t>
-            </a:r>
-            <a:endParaRPr lang="en-US" dirty="0"/>
-          </a:p>
-        </p:txBody>
-      </p:sp>
-    </p:spTree>
-    <p:extLst>
-      <p:ext uri="{BB962C8B-B14F-4D97-AF65-F5344CB8AC3E}">
-        <p14:creationId xmlns:p14="http://schemas.microsoft.com/office/powerpoint/2010/main" val="1497836227"/>
-      </p:ext>
-    </p:extLst>
-  </p:cSld>
-  <p:clrMapOvr>
-    <a:masterClrMapping/>
-  </p:clrMapOvr>
-</p:sld>
-</file>
-
-<file path=ppt/slides/slide22.xml><?xml version="1.0" encoding="utf-8"?>
-<p:sld xmlns:a="http://schemas.openxmlformats.org/drawingml/2006/main" xmlns:r="http://schemas.openxmlformats.org/officeDocument/2006/relationships" xmlns:p="http://schemas.openxmlformats.org/presentationml/2006/main">
-  <p:cSld>
-    <p:spTree>
-      <p:nvGrpSpPr>
-        <p:cNvPr id="1" name=""/>
-        <p:cNvGrpSpPr/>
-        <p:nvPr/>
-      </p:nvGrpSpPr>
-      <p:grpSpPr>
-        <a:xfrm>
-          <a:off x="0" y="0"/>
-          <a:ext cx="0" cy="0"/>
-          <a:chOff x="0" y="0"/>
-          <a:chExt cx="0" cy="0"/>
-        </a:xfrm>
-      </p:grpSpPr>
-      <p:sp>
-        <p:nvSpPr>
-          <p:cNvPr id="2" name="Title 1"/>
-          <p:cNvSpPr>
-            <a:spLocks noGrp="1"/>
-          </p:cNvSpPr>
-          <p:nvPr>
-            <p:ph type="title"/>
-          </p:nvPr>
-        </p:nvSpPr>
-        <p:spPr/>
-        <p:txBody>
-          <a:bodyPr/>
-          <a:lstStyle/>
-          <a:p>
-            <a:r>
-              <a:rPr lang="en-US" dirty="0"/>
               <a:t>K-Means Clustering</a:t>
             </a:r>
             <a:endParaRPr lang="he-IL" dirty="0"/>
@@ -6503,7 +6387,7 @@
 </p:sld>
 </file>
 
-<file path=ppt/slides/slide23.xml><?xml version="1.0" encoding="utf-8"?>
+<file path=ppt/slides/slide22.xml><?xml version="1.0" encoding="utf-8"?>
 <p:sld xmlns:a="http://schemas.openxmlformats.org/drawingml/2006/main" xmlns:r="http://schemas.openxmlformats.org/officeDocument/2006/relationships" xmlns:p="http://schemas.openxmlformats.org/presentationml/2006/main">
   <p:cSld>
     <p:spTree>
@@ -7147,7 +7031,7 @@
 </p:sld>
 </file>
 
-<file path=ppt/slides/slide24.xml><?xml version="1.0" encoding="utf-8"?>
+<file path=ppt/slides/slide23.xml><?xml version="1.0" encoding="utf-8"?>
 <p:sld xmlns:a="http://schemas.openxmlformats.org/drawingml/2006/main" xmlns:r="http://schemas.openxmlformats.org/officeDocument/2006/relationships" xmlns:p="http://schemas.openxmlformats.org/presentationml/2006/main">
   <p:cSld>
     <p:spTree>
@@ -7301,7 +7185,7 @@
 </p:sld>
 </file>
 
-<file path=ppt/slides/slide25.xml><?xml version="1.0" encoding="utf-8"?>
+<file path=ppt/slides/slide24.xml><?xml version="1.0" encoding="utf-8"?>
 <p:sld xmlns:a="http://schemas.openxmlformats.org/drawingml/2006/main" xmlns:r="http://schemas.openxmlformats.org/officeDocument/2006/relationships" xmlns:p="http://schemas.openxmlformats.org/presentationml/2006/main">
   <p:cSld>
     <p:spTree>
@@ -7455,7 +7339,7 @@
 </p:sld>
 </file>
 
-<file path=ppt/slides/slide26.xml><?xml version="1.0" encoding="utf-8"?>
+<file path=ppt/slides/slide25.xml><?xml version="1.0" encoding="utf-8"?>
 <p:sld xmlns:a="http://schemas.openxmlformats.org/drawingml/2006/main" xmlns:r="http://schemas.openxmlformats.org/officeDocument/2006/relationships" xmlns:p="http://schemas.openxmlformats.org/presentationml/2006/main">
   <p:cSld>
     <p:spTree>
@@ -8286,7 +8170,7 @@
 </p:sld>
 </file>
 
-<file path=ppt/slides/slide27.xml><?xml version="1.0" encoding="utf-8"?>
+<file path=ppt/slides/slide26.xml><?xml version="1.0" encoding="utf-8"?>
 <p:sld xmlns:a="http://schemas.openxmlformats.org/drawingml/2006/main" xmlns:r="http://schemas.openxmlformats.org/officeDocument/2006/relationships" xmlns:p="http://schemas.openxmlformats.org/presentationml/2006/main">
   <p:cSld>
     <p:spTree>
@@ -8971,7 +8855,7 @@
 </p:sld>
 </file>
 
-<file path=ppt/slides/slide28.xml><?xml version="1.0" encoding="utf-8"?>
+<file path=ppt/slides/slide27.xml><?xml version="1.0" encoding="utf-8"?>
 <p:sld xmlns:a="http://schemas.openxmlformats.org/drawingml/2006/main" xmlns:r="http://schemas.openxmlformats.org/officeDocument/2006/relationships" xmlns:p="http://schemas.openxmlformats.org/presentationml/2006/main">
   <p:cSld>
     <p:spTree>
@@ -9078,7 +8962,7 @@
 </p:sld>
 </file>
 
-<file path=ppt/slides/slide29.xml><?xml version="1.0" encoding="utf-8"?>
+<file path=ppt/slides/slide28.xml><?xml version="1.0" encoding="utf-8"?>
 <p:sld xmlns:a="http://schemas.openxmlformats.org/drawingml/2006/main" xmlns:r="http://schemas.openxmlformats.org/officeDocument/2006/relationships" xmlns:p="http://schemas.openxmlformats.org/presentationml/2006/main">
   <p:cSld>
     <p:spTree>
@@ -9236,6 +9120,78 @@
 </p:sld>
 </file>
 
+<file path=ppt/slides/slide29.xml><?xml version="1.0" encoding="utf-8"?>
+<p:sld xmlns:a="http://schemas.openxmlformats.org/drawingml/2006/main" xmlns:r="http://schemas.openxmlformats.org/officeDocument/2006/relationships" xmlns:p="http://schemas.openxmlformats.org/presentationml/2006/main">
+  <p:cSld>
+    <p:spTree>
+      <p:nvGrpSpPr>
+        <p:cNvPr id="1" name=""/>
+        <p:cNvGrpSpPr/>
+        <p:nvPr/>
+      </p:nvGrpSpPr>
+      <p:grpSpPr>
+        <a:xfrm>
+          <a:off x="0" y="0"/>
+          <a:ext cx="0" cy="0"/>
+          <a:chOff x="0" y="0"/>
+          <a:chExt cx="0" cy="0"/>
+        </a:xfrm>
+      </p:grpSpPr>
+      <p:sp>
+        <p:nvSpPr>
+          <p:cNvPr id="2" name="כותרת 1"/>
+          <p:cNvSpPr>
+            <a:spLocks noGrp="1"/>
+          </p:cNvSpPr>
+          <p:nvPr>
+            <p:ph type="title"/>
+          </p:nvPr>
+        </p:nvSpPr>
+        <p:spPr/>
+        <p:txBody>
+          <a:bodyPr/>
+          <a:lstStyle/>
+          <a:p>
+            <a:r>
+              <a:rPr lang="en-US" dirty="0"/>
+              <a:t>Hierarchical Clustering after PCA</a:t>
+            </a:r>
+            <a:endParaRPr lang="he-IL" dirty="0"/>
+          </a:p>
+        </p:txBody>
+      </p:sp>
+      <p:sp>
+        <p:nvSpPr>
+          <p:cNvPr id="3" name="מציין מיקום תוכן 2"/>
+          <p:cNvSpPr>
+            <a:spLocks noGrp="1"/>
+          </p:cNvSpPr>
+          <p:nvPr>
+            <p:ph idx="1"/>
+          </p:nvPr>
+        </p:nvSpPr>
+        <p:spPr/>
+        <p:txBody>
+          <a:bodyPr/>
+          <a:lstStyle/>
+          <a:p>
+            <a:endParaRPr lang="he-IL" dirty="0"/>
+          </a:p>
+        </p:txBody>
+      </p:sp>
+    </p:spTree>
+    <p:extLst>
+      <p:ext uri="{BB962C8B-B14F-4D97-AF65-F5344CB8AC3E}">
+        <p14:creationId xmlns:p14="http://schemas.microsoft.com/office/powerpoint/2010/main" val="735607103"/>
+      </p:ext>
+    </p:extLst>
+  </p:cSld>
+  <p:clrMapOvr>
+    <a:masterClrMapping/>
+  </p:clrMapOvr>
+</p:sld>
+</file>
+
 <file path=ppt/slides/slide3.xml><?xml version="1.0" encoding="utf-8"?>
 <p:sld xmlns:a="http://schemas.openxmlformats.org/drawingml/2006/main" xmlns:r="http://schemas.openxmlformats.org/officeDocument/2006/relationships" xmlns:p="http://schemas.openxmlformats.org/presentationml/2006/main">
   <p:cSld>
@@ -9357,78 +9313,6 @@
       </p:grpSpPr>
       <p:sp>
         <p:nvSpPr>
-          <p:cNvPr id="2" name="כותרת 1"/>
-          <p:cNvSpPr>
-            <a:spLocks noGrp="1"/>
-          </p:cNvSpPr>
-          <p:nvPr>
-            <p:ph type="title"/>
-          </p:nvPr>
-        </p:nvSpPr>
-        <p:spPr/>
-        <p:txBody>
-          <a:bodyPr/>
-          <a:lstStyle/>
-          <a:p>
-            <a:r>
-              <a:rPr lang="en-US" dirty="0"/>
-              <a:t>Hierarchical Clustering after PCA</a:t>
-            </a:r>
-            <a:endParaRPr lang="he-IL" dirty="0"/>
-          </a:p>
-        </p:txBody>
-      </p:sp>
-      <p:sp>
-        <p:nvSpPr>
-          <p:cNvPr id="3" name="מציין מיקום תוכן 2"/>
-          <p:cNvSpPr>
-            <a:spLocks noGrp="1"/>
-          </p:cNvSpPr>
-          <p:nvPr>
-            <p:ph idx="1"/>
-          </p:nvPr>
-        </p:nvSpPr>
-        <p:spPr/>
-        <p:txBody>
-          <a:bodyPr/>
-          <a:lstStyle/>
-          <a:p>
-            <a:endParaRPr lang="he-IL" dirty="0"/>
-          </a:p>
-        </p:txBody>
-      </p:sp>
-    </p:spTree>
-    <p:extLst>
-      <p:ext uri="{BB962C8B-B14F-4D97-AF65-F5344CB8AC3E}">
-        <p14:creationId xmlns:p14="http://schemas.microsoft.com/office/powerpoint/2010/main" val="735607103"/>
-      </p:ext>
-    </p:extLst>
-  </p:cSld>
-  <p:clrMapOvr>
-    <a:masterClrMapping/>
-  </p:clrMapOvr>
-</p:sld>
-</file>
-
-<file path=ppt/slides/slide31.xml><?xml version="1.0" encoding="utf-8"?>
-<p:sld xmlns:a="http://schemas.openxmlformats.org/drawingml/2006/main" xmlns:r="http://schemas.openxmlformats.org/officeDocument/2006/relationships" xmlns:p="http://schemas.openxmlformats.org/presentationml/2006/main">
-  <p:cSld>
-    <p:spTree>
-      <p:nvGrpSpPr>
-        <p:cNvPr id="1" name=""/>
-        <p:cNvGrpSpPr/>
-        <p:nvPr/>
-      </p:nvGrpSpPr>
-      <p:grpSpPr>
-        <a:xfrm>
-          <a:off x="0" y="0"/>
-          <a:ext cx="0" cy="0"/>
-          <a:chOff x="0" y="0"/>
-          <a:chExt cx="0" cy="0"/>
-        </a:xfrm>
-      </p:grpSpPr>
-      <p:sp>
-        <p:nvSpPr>
           <p:cNvPr id="2" name="Title 1"/>
           <p:cNvSpPr>
             <a:spLocks noGrp="1"/>
@@ -9509,7 +9393,7 @@
 </p:sld>
 </file>
 
-<file path=ppt/slides/slide32.xml><?xml version="1.0" encoding="utf-8"?>
+<file path=ppt/slides/slide31.xml><?xml version="1.0" encoding="utf-8"?>
 <p:sld xmlns:a="http://schemas.openxmlformats.org/drawingml/2006/main" xmlns:r="http://schemas.openxmlformats.org/officeDocument/2006/relationships" xmlns:p="http://schemas.openxmlformats.org/presentationml/2006/main">
   <p:cSld>
     <p:spTree>
@@ -9631,7 +9515,7 @@
 </p:sld>
 </file>
 
-<file path=ppt/slides/slide33.xml><?xml version="1.0" encoding="utf-8"?>
+<file path=ppt/slides/slide32.xml><?xml version="1.0" encoding="utf-8"?>
 <p:sld xmlns:a="http://schemas.openxmlformats.org/drawingml/2006/main" xmlns:r="http://schemas.openxmlformats.org/officeDocument/2006/relationships" xmlns:p="http://schemas.openxmlformats.org/presentationml/2006/main">
   <p:cSld>
     <p:spTree>
@@ -11552,70 +11436,6 @@
       </p:grpSpPr>
       <p:sp>
         <p:nvSpPr>
-          <p:cNvPr id="3" name="Content Placeholder 2"/>
-          <p:cNvSpPr>
-            <a:spLocks noGrp="1"/>
-          </p:cNvSpPr>
-          <p:nvPr>
-            <p:ph idx="1"/>
-          </p:nvPr>
-        </p:nvSpPr>
-        <p:spPr/>
-        <p:txBody>
-          <a:bodyPr>
-            <a:normAutofit/>
-          </a:bodyPr>
-          <a:lstStyle/>
-          <a:p>
-            <a:r>
-              <a:rPr lang="en-US" sz="2400" dirty="0"/>
-              <a:t>Recommender systems are especially useful when the number of items is large</a:t>
-            </a:r>
-          </a:p>
-          <a:p>
-            <a:endParaRPr lang="en-US" sz="2400" dirty="0"/>
-          </a:p>
-          <a:p>
-            <a:r>
-              <a:rPr lang="en-US" sz="2400" dirty="0"/>
-              <a:t>PROBLEM WITH USING GRU</a:t>
-            </a:r>
-            <a:endParaRPr lang="he-IL" sz="2400" dirty="0"/>
-          </a:p>
-        </p:txBody>
-      </p:sp>
-    </p:spTree>
-    <p:extLst>
-      <p:ext uri="{BB962C8B-B14F-4D97-AF65-F5344CB8AC3E}">
-        <p14:creationId xmlns:p14="http://schemas.microsoft.com/office/powerpoint/2010/main" val="1181515961"/>
-      </p:ext>
-    </p:extLst>
-  </p:cSld>
-  <p:clrMapOvr>
-    <a:masterClrMapping/>
-  </p:clrMapOvr>
-</p:sld>
-</file>
-
-<file path=ppt/slides/slide9.xml><?xml version="1.0" encoding="utf-8"?>
-<p:sld xmlns:a="http://schemas.openxmlformats.org/drawingml/2006/main" xmlns:r="http://schemas.openxmlformats.org/officeDocument/2006/relationships" xmlns:p="http://schemas.openxmlformats.org/presentationml/2006/main">
-  <p:cSld>
-    <p:spTree>
-      <p:nvGrpSpPr>
-        <p:cNvPr id="1" name=""/>
-        <p:cNvGrpSpPr/>
-        <p:nvPr/>
-      </p:nvGrpSpPr>
-      <p:grpSpPr>
-        <a:xfrm>
-          <a:off x="0" y="0"/>
-          <a:ext cx="0" cy="0"/>
-          <a:chOff x="0" y="0"/>
-          <a:chExt cx="0" cy="0"/>
-        </a:xfrm>
-      </p:grpSpPr>
-      <p:sp>
-        <p:nvSpPr>
           <p:cNvPr id="2" name="Title 1"/>
           <p:cNvSpPr>
             <a:spLocks noGrp="1"/>
@@ -11711,6 +11531,121 @@
     <p:extLst>
       <p:ext uri="{BB962C8B-B14F-4D97-AF65-F5344CB8AC3E}">
         <p14:creationId xmlns:p14="http://schemas.microsoft.com/office/powerpoint/2010/main" val="34362879"/>
+      </p:ext>
+    </p:extLst>
+  </p:cSld>
+  <p:clrMapOvr>
+    <a:masterClrMapping/>
+  </p:clrMapOvr>
+</p:sld>
+</file>
+
+<file path=ppt/slides/slide9.xml><?xml version="1.0" encoding="utf-8"?>
+<p:sld xmlns:a="http://schemas.openxmlformats.org/drawingml/2006/main" xmlns:r="http://schemas.openxmlformats.org/officeDocument/2006/relationships" xmlns:p="http://schemas.openxmlformats.org/presentationml/2006/main">
+  <p:cSld>
+    <p:spTree>
+      <p:nvGrpSpPr>
+        <p:cNvPr id="1" name=""/>
+        <p:cNvGrpSpPr/>
+        <p:nvPr/>
+      </p:nvGrpSpPr>
+      <p:grpSpPr>
+        <a:xfrm>
+          <a:off x="0" y="0"/>
+          <a:ext cx="0" cy="0"/>
+          <a:chOff x="0" y="0"/>
+          <a:chExt cx="0" cy="0"/>
+        </a:xfrm>
+      </p:grpSpPr>
+      <p:sp>
+        <p:nvSpPr>
+          <p:cNvPr id="2" name="Title 1"/>
+          <p:cNvSpPr>
+            <a:spLocks noGrp="1"/>
+          </p:cNvSpPr>
+          <p:nvPr>
+            <p:ph type="title"/>
+          </p:nvPr>
+        </p:nvSpPr>
+        <p:spPr/>
+        <p:txBody>
+          <a:bodyPr>
+            <a:normAutofit/>
+          </a:bodyPr>
+          <a:lstStyle/>
+          <a:p>
+            <a:r>
+              <a:rPr lang="en-US" dirty="0"/>
+              <a:t>Comparing queries of new and experienced users</a:t>
+            </a:r>
+            <a:endParaRPr lang="he-IL" dirty="0"/>
+          </a:p>
+        </p:txBody>
+      </p:sp>
+      <p:sp>
+        <p:nvSpPr>
+          <p:cNvPr id="4" name="Content Placeholder 3"/>
+          <p:cNvSpPr>
+            <a:spLocks noGrp="1"/>
+          </p:cNvSpPr>
+          <p:nvPr>
+            <p:ph idx="1"/>
+          </p:nvPr>
+        </p:nvSpPr>
+        <p:spPr>
+          <a:xfrm>
+            <a:off x="457200" y="1600200"/>
+            <a:ext cx="8229600" cy="4709120"/>
+          </a:xfrm>
+        </p:spPr>
+        <p:txBody>
+          <a:bodyPr>
+            <a:normAutofit/>
+          </a:bodyPr>
+          <a:lstStyle/>
+          <a:p>
+            <a:r>
+              <a:rPr lang="en-US" dirty="0"/>
+              <a:t>It is visible that there are several dominant queries:</a:t>
+            </a:r>
+          </a:p>
+          <a:p>
+            <a:pPr lvl="1"/>
+            <a:r>
+              <a:rPr lang="en-US" dirty="0" err="1"/>
+              <a:t>RequestSummaryQuery</a:t>
+            </a:r>
+            <a:endParaRPr lang="en-US" dirty="0"/>
+          </a:p>
+          <a:p>
+            <a:pPr lvl="1"/>
+            <a:r>
+              <a:rPr lang="en-US" dirty="0" err="1"/>
+              <a:t>SearchTimelineQuery</a:t>
+            </a:r>
+            <a:endParaRPr lang="en-US" dirty="0"/>
+          </a:p>
+          <a:p>
+            <a:pPr lvl="1"/>
+            <a:r>
+              <a:rPr lang="en-US" dirty="0" err="1"/>
+              <a:t>RequestSeriesAndSummaryQuery</a:t>
+            </a:r>
+            <a:endParaRPr lang="en-US" dirty="0"/>
+          </a:p>
+          <a:p>
+            <a:endParaRPr lang="en-US" dirty="0"/>
+          </a:p>
+          <a:p>
+            <a:pPr lvl="1"/>
+            <a:endParaRPr lang="en-US" dirty="0"/>
+          </a:p>
+        </p:txBody>
+      </p:sp>
+    </p:spTree>
+    <p:extLst>
+      <p:ext uri="{BB962C8B-B14F-4D97-AF65-F5344CB8AC3E}">
+        <p14:creationId xmlns:p14="http://schemas.microsoft.com/office/powerpoint/2010/main" val="1788058214"/>
       </p:ext>
     </p:extLst>
   </p:cSld>

</xml_diff>